<commit_message>
add rdbms new data from lab/drive
</commit_message>
<xml_diff>
--- a/Sem-1/RDBMS Theory/Unit-3/Day_11.pptx
+++ b/Sem-1/RDBMS Theory/Unit-3/Day_11.pptx
@@ -147,7 +147,7 @@
           <p:cNvPr id="2" name="Title 1">
             <a:extLst>
               <a:ext uri="{FF2B5EF4-FFF2-40B4-BE49-F238E27FC236}">
-                <a16:creationId xmlns:a16="http://schemas.microsoft.com/office/drawing/2014/main" id="{A7FF55BC-7A2B-48B0-B739-681F68043842}"/>
+                <a16:creationId xmlns:a16="http://schemas.microsoft.com/office/drawing/2014/main" xmlns="" id="{A7FF55BC-7A2B-48B0-B739-681F68043842}"/>
               </a:ext>
             </a:extLst>
           </p:cNvPr>
@@ -185,7 +185,7 @@
           <p:cNvPr id="3" name="Subtitle 2">
             <a:extLst>
               <a:ext uri="{FF2B5EF4-FFF2-40B4-BE49-F238E27FC236}">
-                <a16:creationId xmlns:a16="http://schemas.microsoft.com/office/drawing/2014/main" id="{81823BC3-43F0-4B67-86B2-4284E1241B98}"/>
+                <a16:creationId xmlns:a16="http://schemas.microsoft.com/office/drawing/2014/main" xmlns="" id="{81823BC3-43F0-4B67-86B2-4284E1241B98}"/>
               </a:ext>
             </a:extLst>
           </p:cNvPr>
@@ -256,7 +256,7 @@
           <p:cNvPr id="4" name="Date Placeholder 3">
             <a:extLst>
               <a:ext uri="{FF2B5EF4-FFF2-40B4-BE49-F238E27FC236}">
-                <a16:creationId xmlns:a16="http://schemas.microsoft.com/office/drawing/2014/main" id="{B488D9BE-AD1C-4687-98A2-353FD5BB7141}"/>
+                <a16:creationId xmlns:a16="http://schemas.microsoft.com/office/drawing/2014/main" xmlns="" id="{B488D9BE-AD1C-4687-98A2-353FD5BB7141}"/>
               </a:ext>
             </a:extLst>
           </p:cNvPr>
@@ -274,7 +274,7 @@
           <a:p>
             <a:fld id="{B37DD9E5-83AB-41E0-B8BF-4643EADF3FE0}" type="datetimeFigureOut">
               <a:rPr lang="en-IN" smtClean="0"/>
-              <a:t>02-12-2021</a:t>
+              <a:t>18-09-2025</a:t>
             </a:fld>
             <a:endParaRPr lang="en-IN"/>
           </a:p>
@@ -285,7 +285,7 @@
           <p:cNvPr id="5" name="Footer Placeholder 4">
             <a:extLst>
               <a:ext uri="{FF2B5EF4-FFF2-40B4-BE49-F238E27FC236}">
-                <a16:creationId xmlns:a16="http://schemas.microsoft.com/office/drawing/2014/main" id="{85E2F018-A45B-465F-96AB-A04FC0247007}"/>
+                <a16:creationId xmlns:a16="http://schemas.microsoft.com/office/drawing/2014/main" xmlns="" id="{85E2F018-A45B-465F-96AB-A04FC0247007}"/>
               </a:ext>
             </a:extLst>
           </p:cNvPr>
@@ -310,7 +310,7 @@
           <p:cNvPr id="6" name="Slide Number Placeholder 5">
             <a:extLst>
               <a:ext uri="{FF2B5EF4-FFF2-40B4-BE49-F238E27FC236}">
-                <a16:creationId xmlns:a16="http://schemas.microsoft.com/office/drawing/2014/main" id="{518AD6C9-3BFC-4F9F-8721-065E47A350E9}"/>
+                <a16:creationId xmlns:a16="http://schemas.microsoft.com/office/drawing/2014/main" xmlns="" id="{518AD6C9-3BFC-4F9F-8721-065E47A350E9}"/>
               </a:ext>
             </a:extLst>
           </p:cNvPr>
@@ -369,7 +369,7 @@
           <p:cNvPr id="2" name="Title 1">
             <a:extLst>
               <a:ext uri="{FF2B5EF4-FFF2-40B4-BE49-F238E27FC236}">
-                <a16:creationId xmlns:a16="http://schemas.microsoft.com/office/drawing/2014/main" id="{B53E0813-B915-4718-87B6-BB955D6F52FD}"/>
+                <a16:creationId xmlns:a16="http://schemas.microsoft.com/office/drawing/2014/main" xmlns="" id="{B53E0813-B915-4718-87B6-BB955D6F52FD}"/>
               </a:ext>
             </a:extLst>
           </p:cNvPr>
@@ -398,7 +398,7 @@
           <p:cNvPr id="3" name="Vertical Text Placeholder 2">
             <a:extLst>
               <a:ext uri="{FF2B5EF4-FFF2-40B4-BE49-F238E27FC236}">
-                <a16:creationId xmlns:a16="http://schemas.microsoft.com/office/drawing/2014/main" id="{D208E66C-10BF-479E-86C8-228948584A32}"/>
+                <a16:creationId xmlns:a16="http://schemas.microsoft.com/office/drawing/2014/main" xmlns="" id="{D208E66C-10BF-479E-86C8-228948584A32}"/>
               </a:ext>
             </a:extLst>
           </p:cNvPr>
@@ -456,7 +456,7 @@
           <p:cNvPr id="4" name="Date Placeholder 3">
             <a:extLst>
               <a:ext uri="{FF2B5EF4-FFF2-40B4-BE49-F238E27FC236}">
-                <a16:creationId xmlns:a16="http://schemas.microsoft.com/office/drawing/2014/main" id="{8C8F5CE6-C4AC-4F35-958B-76305FBD2164}"/>
+                <a16:creationId xmlns:a16="http://schemas.microsoft.com/office/drawing/2014/main" xmlns="" id="{8C8F5CE6-C4AC-4F35-958B-76305FBD2164}"/>
               </a:ext>
             </a:extLst>
           </p:cNvPr>
@@ -474,7 +474,7 @@
           <a:p>
             <a:fld id="{B37DD9E5-83AB-41E0-B8BF-4643EADF3FE0}" type="datetimeFigureOut">
               <a:rPr lang="en-IN" smtClean="0"/>
-              <a:t>02-12-2021</a:t>
+              <a:t>18-09-2025</a:t>
             </a:fld>
             <a:endParaRPr lang="en-IN"/>
           </a:p>
@@ -485,7 +485,7 @@
           <p:cNvPr id="5" name="Footer Placeholder 4">
             <a:extLst>
               <a:ext uri="{FF2B5EF4-FFF2-40B4-BE49-F238E27FC236}">
-                <a16:creationId xmlns:a16="http://schemas.microsoft.com/office/drawing/2014/main" id="{CE326CAF-572B-4985-8507-DD7D9C909338}"/>
+                <a16:creationId xmlns:a16="http://schemas.microsoft.com/office/drawing/2014/main" xmlns="" id="{CE326CAF-572B-4985-8507-DD7D9C909338}"/>
               </a:ext>
             </a:extLst>
           </p:cNvPr>
@@ -510,7 +510,7 @@
           <p:cNvPr id="6" name="Slide Number Placeholder 5">
             <a:extLst>
               <a:ext uri="{FF2B5EF4-FFF2-40B4-BE49-F238E27FC236}">
-                <a16:creationId xmlns:a16="http://schemas.microsoft.com/office/drawing/2014/main" id="{F4877B78-26FF-4F44-8104-DE203CFFCC2C}"/>
+                <a16:creationId xmlns:a16="http://schemas.microsoft.com/office/drawing/2014/main" xmlns="" id="{F4877B78-26FF-4F44-8104-DE203CFFCC2C}"/>
               </a:ext>
             </a:extLst>
           </p:cNvPr>
@@ -569,7 +569,7 @@
           <p:cNvPr id="2" name="Vertical Title 1">
             <a:extLst>
               <a:ext uri="{FF2B5EF4-FFF2-40B4-BE49-F238E27FC236}">
-                <a16:creationId xmlns:a16="http://schemas.microsoft.com/office/drawing/2014/main" id="{E571E932-DC37-40B1-A3D1-A1D5ACE08047}"/>
+                <a16:creationId xmlns:a16="http://schemas.microsoft.com/office/drawing/2014/main" xmlns="" id="{E571E932-DC37-40B1-A3D1-A1D5ACE08047}"/>
               </a:ext>
             </a:extLst>
           </p:cNvPr>
@@ -603,7 +603,7 @@
           <p:cNvPr id="3" name="Vertical Text Placeholder 2">
             <a:extLst>
               <a:ext uri="{FF2B5EF4-FFF2-40B4-BE49-F238E27FC236}">
-                <a16:creationId xmlns:a16="http://schemas.microsoft.com/office/drawing/2014/main" id="{11EED918-6311-401D-8343-C090F7E9806B}"/>
+                <a16:creationId xmlns:a16="http://schemas.microsoft.com/office/drawing/2014/main" xmlns="" id="{11EED918-6311-401D-8343-C090F7E9806B}"/>
               </a:ext>
             </a:extLst>
           </p:cNvPr>
@@ -666,7 +666,7 @@
           <p:cNvPr id="4" name="Date Placeholder 3">
             <a:extLst>
               <a:ext uri="{FF2B5EF4-FFF2-40B4-BE49-F238E27FC236}">
-                <a16:creationId xmlns:a16="http://schemas.microsoft.com/office/drawing/2014/main" id="{FA3B6371-746F-4CCB-97A8-265B1897D469}"/>
+                <a16:creationId xmlns:a16="http://schemas.microsoft.com/office/drawing/2014/main" xmlns="" id="{FA3B6371-746F-4CCB-97A8-265B1897D469}"/>
               </a:ext>
             </a:extLst>
           </p:cNvPr>
@@ -684,7 +684,7 @@
           <a:p>
             <a:fld id="{B37DD9E5-83AB-41E0-B8BF-4643EADF3FE0}" type="datetimeFigureOut">
               <a:rPr lang="en-IN" smtClean="0"/>
-              <a:t>02-12-2021</a:t>
+              <a:t>18-09-2025</a:t>
             </a:fld>
             <a:endParaRPr lang="en-IN"/>
           </a:p>
@@ -695,7 +695,7 @@
           <p:cNvPr id="5" name="Footer Placeholder 4">
             <a:extLst>
               <a:ext uri="{FF2B5EF4-FFF2-40B4-BE49-F238E27FC236}">
-                <a16:creationId xmlns:a16="http://schemas.microsoft.com/office/drawing/2014/main" id="{F88C3BEE-3C79-41BC-BE3E-5D58B9D0B055}"/>
+                <a16:creationId xmlns:a16="http://schemas.microsoft.com/office/drawing/2014/main" xmlns="" id="{F88C3BEE-3C79-41BC-BE3E-5D58B9D0B055}"/>
               </a:ext>
             </a:extLst>
           </p:cNvPr>
@@ -720,7 +720,7 @@
           <p:cNvPr id="6" name="Slide Number Placeholder 5">
             <a:extLst>
               <a:ext uri="{FF2B5EF4-FFF2-40B4-BE49-F238E27FC236}">
-                <a16:creationId xmlns:a16="http://schemas.microsoft.com/office/drawing/2014/main" id="{8B503EEC-926B-4DC5-9482-8F79A70FB930}"/>
+                <a16:creationId xmlns:a16="http://schemas.microsoft.com/office/drawing/2014/main" xmlns="" id="{8B503EEC-926B-4DC5-9482-8F79A70FB930}"/>
               </a:ext>
             </a:extLst>
           </p:cNvPr>
@@ -779,7 +779,7 @@
           <p:cNvPr id="2" name="Title 1">
             <a:extLst>
               <a:ext uri="{FF2B5EF4-FFF2-40B4-BE49-F238E27FC236}">
-                <a16:creationId xmlns:a16="http://schemas.microsoft.com/office/drawing/2014/main" id="{A37690B5-1930-4838-AB6F-22D290CBF47F}"/>
+                <a16:creationId xmlns:a16="http://schemas.microsoft.com/office/drawing/2014/main" xmlns="" id="{A37690B5-1930-4838-AB6F-22D290CBF47F}"/>
               </a:ext>
             </a:extLst>
           </p:cNvPr>
@@ -808,7 +808,7 @@
           <p:cNvPr id="3" name="Content Placeholder 2">
             <a:extLst>
               <a:ext uri="{FF2B5EF4-FFF2-40B4-BE49-F238E27FC236}">
-                <a16:creationId xmlns:a16="http://schemas.microsoft.com/office/drawing/2014/main" id="{5852EA5A-BF0D-4B54-A23D-9E47C2E0C322}"/>
+                <a16:creationId xmlns:a16="http://schemas.microsoft.com/office/drawing/2014/main" xmlns="" id="{5852EA5A-BF0D-4B54-A23D-9E47C2E0C322}"/>
               </a:ext>
             </a:extLst>
           </p:cNvPr>
@@ -866,7 +866,7 @@
           <p:cNvPr id="4" name="Date Placeholder 3">
             <a:extLst>
               <a:ext uri="{FF2B5EF4-FFF2-40B4-BE49-F238E27FC236}">
-                <a16:creationId xmlns:a16="http://schemas.microsoft.com/office/drawing/2014/main" id="{AF8FE5F5-7EC8-4A80-9FA2-669746CEBBDF}"/>
+                <a16:creationId xmlns:a16="http://schemas.microsoft.com/office/drawing/2014/main" xmlns="" id="{AF8FE5F5-7EC8-4A80-9FA2-669746CEBBDF}"/>
               </a:ext>
             </a:extLst>
           </p:cNvPr>
@@ -884,7 +884,7 @@
           <a:p>
             <a:fld id="{B37DD9E5-83AB-41E0-B8BF-4643EADF3FE0}" type="datetimeFigureOut">
               <a:rPr lang="en-IN" smtClean="0"/>
-              <a:t>02-12-2021</a:t>
+              <a:t>18-09-2025</a:t>
             </a:fld>
             <a:endParaRPr lang="en-IN"/>
           </a:p>
@@ -895,7 +895,7 @@
           <p:cNvPr id="5" name="Footer Placeholder 4">
             <a:extLst>
               <a:ext uri="{FF2B5EF4-FFF2-40B4-BE49-F238E27FC236}">
-                <a16:creationId xmlns:a16="http://schemas.microsoft.com/office/drawing/2014/main" id="{34600653-447C-4868-8B4A-BC09847D4C11}"/>
+                <a16:creationId xmlns:a16="http://schemas.microsoft.com/office/drawing/2014/main" xmlns="" id="{34600653-447C-4868-8B4A-BC09847D4C11}"/>
               </a:ext>
             </a:extLst>
           </p:cNvPr>
@@ -920,7 +920,7 @@
           <p:cNvPr id="6" name="Slide Number Placeholder 5">
             <a:extLst>
               <a:ext uri="{FF2B5EF4-FFF2-40B4-BE49-F238E27FC236}">
-                <a16:creationId xmlns:a16="http://schemas.microsoft.com/office/drawing/2014/main" id="{4E70F46D-324F-4B1E-9625-EA22B0988466}"/>
+                <a16:creationId xmlns:a16="http://schemas.microsoft.com/office/drawing/2014/main" xmlns="" id="{4E70F46D-324F-4B1E-9625-EA22B0988466}"/>
               </a:ext>
             </a:extLst>
           </p:cNvPr>
@@ -979,7 +979,7 @@
           <p:cNvPr id="2" name="Title 1">
             <a:extLst>
               <a:ext uri="{FF2B5EF4-FFF2-40B4-BE49-F238E27FC236}">
-                <a16:creationId xmlns:a16="http://schemas.microsoft.com/office/drawing/2014/main" id="{DDBDAF4B-E978-4F19-9B28-7EAFEF69FC23}"/>
+                <a16:creationId xmlns:a16="http://schemas.microsoft.com/office/drawing/2014/main" xmlns="" id="{DDBDAF4B-E978-4F19-9B28-7EAFEF69FC23}"/>
               </a:ext>
             </a:extLst>
           </p:cNvPr>
@@ -1017,7 +1017,7 @@
           <p:cNvPr id="3" name="Text Placeholder 2">
             <a:extLst>
               <a:ext uri="{FF2B5EF4-FFF2-40B4-BE49-F238E27FC236}">
-                <a16:creationId xmlns:a16="http://schemas.microsoft.com/office/drawing/2014/main" id="{7AB23006-74A5-434F-8DCA-0B56D0D9B25D}"/>
+                <a16:creationId xmlns:a16="http://schemas.microsoft.com/office/drawing/2014/main" xmlns="" id="{7AB23006-74A5-434F-8DCA-0B56D0D9B25D}"/>
               </a:ext>
             </a:extLst>
           </p:cNvPr>
@@ -1142,7 +1142,7 @@
           <p:cNvPr id="4" name="Date Placeholder 3">
             <a:extLst>
               <a:ext uri="{FF2B5EF4-FFF2-40B4-BE49-F238E27FC236}">
-                <a16:creationId xmlns:a16="http://schemas.microsoft.com/office/drawing/2014/main" id="{28B6CC0F-3453-4162-B40A-B1EA188580A2}"/>
+                <a16:creationId xmlns:a16="http://schemas.microsoft.com/office/drawing/2014/main" xmlns="" id="{28B6CC0F-3453-4162-B40A-B1EA188580A2}"/>
               </a:ext>
             </a:extLst>
           </p:cNvPr>
@@ -1160,7 +1160,7 @@
           <a:p>
             <a:fld id="{B37DD9E5-83AB-41E0-B8BF-4643EADF3FE0}" type="datetimeFigureOut">
               <a:rPr lang="en-IN" smtClean="0"/>
-              <a:t>02-12-2021</a:t>
+              <a:t>18-09-2025</a:t>
             </a:fld>
             <a:endParaRPr lang="en-IN"/>
           </a:p>
@@ -1171,7 +1171,7 @@
           <p:cNvPr id="5" name="Footer Placeholder 4">
             <a:extLst>
               <a:ext uri="{FF2B5EF4-FFF2-40B4-BE49-F238E27FC236}">
-                <a16:creationId xmlns:a16="http://schemas.microsoft.com/office/drawing/2014/main" id="{9BF0E733-DD02-4436-AD16-FF412A538784}"/>
+                <a16:creationId xmlns:a16="http://schemas.microsoft.com/office/drawing/2014/main" xmlns="" id="{9BF0E733-DD02-4436-AD16-FF412A538784}"/>
               </a:ext>
             </a:extLst>
           </p:cNvPr>
@@ -1196,7 +1196,7 @@
           <p:cNvPr id="6" name="Slide Number Placeholder 5">
             <a:extLst>
               <a:ext uri="{FF2B5EF4-FFF2-40B4-BE49-F238E27FC236}">
-                <a16:creationId xmlns:a16="http://schemas.microsoft.com/office/drawing/2014/main" id="{73EC6C90-C256-401D-9D34-8AD4B44912C1}"/>
+                <a16:creationId xmlns:a16="http://schemas.microsoft.com/office/drawing/2014/main" xmlns="" id="{73EC6C90-C256-401D-9D34-8AD4B44912C1}"/>
               </a:ext>
             </a:extLst>
           </p:cNvPr>
@@ -1255,7 +1255,7 @@
           <p:cNvPr id="2" name="Title 1">
             <a:extLst>
               <a:ext uri="{FF2B5EF4-FFF2-40B4-BE49-F238E27FC236}">
-                <a16:creationId xmlns:a16="http://schemas.microsoft.com/office/drawing/2014/main" id="{52560A0D-0DAC-4C07-B3FE-7E887076D5D2}"/>
+                <a16:creationId xmlns:a16="http://schemas.microsoft.com/office/drawing/2014/main" xmlns="" id="{52560A0D-0DAC-4C07-B3FE-7E887076D5D2}"/>
               </a:ext>
             </a:extLst>
           </p:cNvPr>
@@ -1284,7 +1284,7 @@
           <p:cNvPr id="3" name="Content Placeholder 2">
             <a:extLst>
               <a:ext uri="{FF2B5EF4-FFF2-40B4-BE49-F238E27FC236}">
-                <a16:creationId xmlns:a16="http://schemas.microsoft.com/office/drawing/2014/main" id="{3EFDA7A0-AFBC-48BE-A9A0-7BA2ECADC95A}"/>
+                <a16:creationId xmlns:a16="http://schemas.microsoft.com/office/drawing/2014/main" xmlns="" id="{3EFDA7A0-AFBC-48BE-A9A0-7BA2ECADC95A}"/>
               </a:ext>
             </a:extLst>
           </p:cNvPr>
@@ -1347,7 +1347,7 @@
           <p:cNvPr id="4" name="Content Placeholder 3">
             <a:extLst>
               <a:ext uri="{FF2B5EF4-FFF2-40B4-BE49-F238E27FC236}">
-                <a16:creationId xmlns:a16="http://schemas.microsoft.com/office/drawing/2014/main" id="{063F01C7-AD2D-4DBE-AA25-8D7A71756069}"/>
+                <a16:creationId xmlns:a16="http://schemas.microsoft.com/office/drawing/2014/main" xmlns="" id="{063F01C7-AD2D-4DBE-AA25-8D7A71756069}"/>
               </a:ext>
             </a:extLst>
           </p:cNvPr>
@@ -1410,7 +1410,7 @@
           <p:cNvPr id="5" name="Date Placeholder 4">
             <a:extLst>
               <a:ext uri="{FF2B5EF4-FFF2-40B4-BE49-F238E27FC236}">
-                <a16:creationId xmlns:a16="http://schemas.microsoft.com/office/drawing/2014/main" id="{808FFC57-003A-4727-A9FA-8947741EB39B}"/>
+                <a16:creationId xmlns:a16="http://schemas.microsoft.com/office/drawing/2014/main" xmlns="" id="{808FFC57-003A-4727-A9FA-8947741EB39B}"/>
               </a:ext>
             </a:extLst>
           </p:cNvPr>
@@ -1428,7 +1428,7 @@
           <a:p>
             <a:fld id="{B37DD9E5-83AB-41E0-B8BF-4643EADF3FE0}" type="datetimeFigureOut">
               <a:rPr lang="en-IN" smtClean="0"/>
-              <a:t>02-12-2021</a:t>
+              <a:t>18-09-2025</a:t>
             </a:fld>
             <a:endParaRPr lang="en-IN"/>
           </a:p>
@@ -1439,7 +1439,7 @@
           <p:cNvPr id="6" name="Footer Placeholder 5">
             <a:extLst>
               <a:ext uri="{FF2B5EF4-FFF2-40B4-BE49-F238E27FC236}">
-                <a16:creationId xmlns:a16="http://schemas.microsoft.com/office/drawing/2014/main" id="{79858160-0921-4266-9FDE-293EAC39FA4F}"/>
+                <a16:creationId xmlns:a16="http://schemas.microsoft.com/office/drawing/2014/main" xmlns="" id="{79858160-0921-4266-9FDE-293EAC39FA4F}"/>
               </a:ext>
             </a:extLst>
           </p:cNvPr>
@@ -1464,7 +1464,7 @@
           <p:cNvPr id="7" name="Slide Number Placeholder 6">
             <a:extLst>
               <a:ext uri="{FF2B5EF4-FFF2-40B4-BE49-F238E27FC236}">
-                <a16:creationId xmlns:a16="http://schemas.microsoft.com/office/drawing/2014/main" id="{12AC0E88-7907-41F1-B226-0839B34EC47E}"/>
+                <a16:creationId xmlns:a16="http://schemas.microsoft.com/office/drawing/2014/main" xmlns="" id="{12AC0E88-7907-41F1-B226-0839B34EC47E}"/>
               </a:ext>
             </a:extLst>
           </p:cNvPr>
@@ -1523,7 +1523,7 @@
           <p:cNvPr id="2" name="Title 1">
             <a:extLst>
               <a:ext uri="{FF2B5EF4-FFF2-40B4-BE49-F238E27FC236}">
-                <a16:creationId xmlns:a16="http://schemas.microsoft.com/office/drawing/2014/main" id="{3C074F1C-F59E-4DF6-A249-0C561E614C1A}"/>
+                <a16:creationId xmlns:a16="http://schemas.microsoft.com/office/drawing/2014/main" xmlns="" id="{3C074F1C-F59E-4DF6-A249-0C561E614C1A}"/>
               </a:ext>
             </a:extLst>
           </p:cNvPr>
@@ -1557,7 +1557,7 @@
           <p:cNvPr id="3" name="Text Placeholder 2">
             <a:extLst>
               <a:ext uri="{FF2B5EF4-FFF2-40B4-BE49-F238E27FC236}">
-                <a16:creationId xmlns:a16="http://schemas.microsoft.com/office/drawing/2014/main" id="{D8100C1B-4F18-4F1A-A82D-7EE7B2F36E7F}"/>
+                <a16:creationId xmlns:a16="http://schemas.microsoft.com/office/drawing/2014/main" xmlns="" id="{D8100C1B-4F18-4F1A-A82D-7EE7B2F36E7F}"/>
               </a:ext>
             </a:extLst>
           </p:cNvPr>
@@ -1628,7 +1628,7 @@
           <p:cNvPr id="4" name="Content Placeholder 3">
             <a:extLst>
               <a:ext uri="{FF2B5EF4-FFF2-40B4-BE49-F238E27FC236}">
-                <a16:creationId xmlns:a16="http://schemas.microsoft.com/office/drawing/2014/main" id="{DFC7E0B0-563C-486D-BB5E-741CF81C6852}"/>
+                <a16:creationId xmlns:a16="http://schemas.microsoft.com/office/drawing/2014/main" xmlns="" id="{DFC7E0B0-563C-486D-BB5E-741CF81C6852}"/>
               </a:ext>
             </a:extLst>
           </p:cNvPr>
@@ -1691,7 +1691,7 @@
           <p:cNvPr id="5" name="Text Placeholder 4">
             <a:extLst>
               <a:ext uri="{FF2B5EF4-FFF2-40B4-BE49-F238E27FC236}">
-                <a16:creationId xmlns:a16="http://schemas.microsoft.com/office/drawing/2014/main" id="{D00072E7-679F-40F4-A077-8F0D3C20F14E}"/>
+                <a16:creationId xmlns:a16="http://schemas.microsoft.com/office/drawing/2014/main" xmlns="" id="{D00072E7-679F-40F4-A077-8F0D3C20F14E}"/>
               </a:ext>
             </a:extLst>
           </p:cNvPr>
@@ -1762,7 +1762,7 @@
           <p:cNvPr id="6" name="Content Placeholder 5">
             <a:extLst>
               <a:ext uri="{FF2B5EF4-FFF2-40B4-BE49-F238E27FC236}">
-                <a16:creationId xmlns:a16="http://schemas.microsoft.com/office/drawing/2014/main" id="{14635018-331D-4859-A0B6-527367EC6753}"/>
+                <a16:creationId xmlns:a16="http://schemas.microsoft.com/office/drawing/2014/main" xmlns="" id="{14635018-331D-4859-A0B6-527367EC6753}"/>
               </a:ext>
             </a:extLst>
           </p:cNvPr>
@@ -1825,7 +1825,7 @@
           <p:cNvPr id="7" name="Date Placeholder 6">
             <a:extLst>
               <a:ext uri="{FF2B5EF4-FFF2-40B4-BE49-F238E27FC236}">
-                <a16:creationId xmlns:a16="http://schemas.microsoft.com/office/drawing/2014/main" id="{85AA0B15-2497-483E-8866-CC253E07E3FC}"/>
+                <a16:creationId xmlns:a16="http://schemas.microsoft.com/office/drawing/2014/main" xmlns="" id="{85AA0B15-2497-483E-8866-CC253E07E3FC}"/>
               </a:ext>
             </a:extLst>
           </p:cNvPr>
@@ -1843,7 +1843,7 @@
           <a:p>
             <a:fld id="{B37DD9E5-83AB-41E0-B8BF-4643EADF3FE0}" type="datetimeFigureOut">
               <a:rPr lang="en-IN" smtClean="0"/>
-              <a:t>02-12-2021</a:t>
+              <a:t>18-09-2025</a:t>
             </a:fld>
             <a:endParaRPr lang="en-IN"/>
           </a:p>
@@ -1854,7 +1854,7 @@
           <p:cNvPr id="8" name="Footer Placeholder 7">
             <a:extLst>
               <a:ext uri="{FF2B5EF4-FFF2-40B4-BE49-F238E27FC236}">
-                <a16:creationId xmlns:a16="http://schemas.microsoft.com/office/drawing/2014/main" id="{B84EB872-9AFD-4419-96A7-BC479EC8BB95}"/>
+                <a16:creationId xmlns:a16="http://schemas.microsoft.com/office/drawing/2014/main" xmlns="" id="{B84EB872-9AFD-4419-96A7-BC479EC8BB95}"/>
               </a:ext>
             </a:extLst>
           </p:cNvPr>
@@ -1879,7 +1879,7 @@
           <p:cNvPr id="9" name="Slide Number Placeholder 8">
             <a:extLst>
               <a:ext uri="{FF2B5EF4-FFF2-40B4-BE49-F238E27FC236}">
-                <a16:creationId xmlns:a16="http://schemas.microsoft.com/office/drawing/2014/main" id="{20D02390-7B18-4B3E-B0B9-77BF793ED167}"/>
+                <a16:creationId xmlns:a16="http://schemas.microsoft.com/office/drawing/2014/main" xmlns="" id="{20D02390-7B18-4B3E-B0B9-77BF793ED167}"/>
               </a:ext>
             </a:extLst>
           </p:cNvPr>
@@ -1938,7 +1938,7 @@
           <p:cNvPr id="2" name="Title 1">
             <a:extLst>
               <a:ext uri="{FF2B5EF4-FFF2-40B4-BE49-F238E27FC236}">
-                <a16:creationId xmlns:a16="http://schemas.microsoft.com/office/drawing/2014/main" id="{E35F804F-1B37-49F3-A17C-9763BF2D3589}"/>
+                <a16:creationId xmlns:a16="http://schemas.microsoft.com/office/drawing/2014/main" xmlns="" id="{E35F804F-1B37-49F3-A17C-9763BF2D3589}"/>
               </a:ext>
             </a:extLst>
           </p:cNvPr>
@@ -1967,7 +1967,7 @@
           <p:cNvPr id="3" name="Date Placeholder 2">
             <a:extLst>
               <a:ext uri="{FF2B5EF4-FFF2-40B4-BE49-F238E27FC236}">
-                <a16:creationId xmlns:a16="http://schemas.microsoft.com/office/drawing/2014/main" id="{416F9C48-DB99-4C16-9F61-B95B0AA65517}"/>
+                <a16:creationId xmlns:a16="http://schemas.microsoft.com/office/drawing/2014/main" xmlns="" id="{416F9C48-DB99-4C16-9F61-B95B0AA65517}"/>
               </a:ext>
             </a:extLst>
           </p:cNvPr>
@@ -1985,7 +1985,7 @@
           <a:p>
             <a:fld id="{B37DD9E5-83AB-41E0-B8BF-4643EADF3FE0}" type="datetimeFigureOut">
               <a:rPr lang="en-IN" smtClean="0"/>
-              <a:t>02-12-2021</a:t>
+              <a:t>18-09-2025</a:t>
             </a:fld>
             <a:endParaRPr lang="en-IN"/>
           </a:p>
@@ -1996,7 +1996,7 @@
           <p:cNvPr id="4" name="Footer Placeholder 3">
             <a:extLst>
               <a:ext uri="{FF2B5EF4-FFF2-40B4-BE49-F238E27FC236}">
-                <a16:creationId xmlns:a16="http://schemas.microsoft.com/office/drawing/2014/main" id="{16C11A08-0DE9-432C-B898-59489EC0388E}"/>
+                <a16:creationId xmlns:a16="http://schemas.microsoft.com/office/drawing/2014/main" xmlns="" id="{16C11A08-0DE9-432C-B898-59489EC0388E}"/>
               </a:ext>
             </a:extLst>
           </p:cNvPr>
@@ -2021,7 +2021,7 @@
           <p:cNvPr id="5" name="Slide Number Placeholder 4">
             <a:extLst>
               <a:ext uri="{FF2B5EF4-FFF2-40B4-BE49-F238E27FC236}">
-                <a16:creationId xmlns:a16="http://schemas.microsoft.com/office/drawing/2014/main" id="{26E1EBD5-9E88-42B2-9172-3B7BDE4D766E}"/>
+                <a16:creationId xmlns:a16="http://schemas.microsoft.com/office/drawing/2014/main" xmlns="" id="{26E1EBD5-9E88-42B2-9172-3B7BDE4D766E}"/>
               </a:ext>
             </a:extLst>
           </p:cNvPr>
@@ -2080,7 +2080,7 @@
           <p:cNvPr id="2" name="Date Placeholder 1">
             <a:extLst>
               <a:ext uri="{FF2B5EF4-FFF2-40B4-BE49-F238E27FC236}">
-                <a16:creationId xmlns:a16="http://schemas.microsoft.com/office/drawing/2014/main" id="{912E52AB-AFFB-40E7-8372-8B2C29A790C4}"/>
+                <a16:creationId xmlns:a16="http://schemas.microsoft.com/office/drawing/2014/main" xmlns="" id="{912E52AB-AFFB-40E7-8372-8B2C29A790C4}"/>
               </a:ext>
             </a:extLst>
           </p:cNvPr>
@@ -2098,7 +2098,7 @@
           <a:p>
             <a:fld id="{B37DD9E5-83AB-41E0-B8BF-4643EADF3FE0}" type="datetimeFigureOut">
               <a:rPr lang="en-IN" smtClean="0"/>
-              <a:t>02-12-2021</a:t>
+              <a:t>18-09-2025</a:t>
             </a:fld>
             <a:endParaRPr lang="en-IN"/>
           </a:p>
@@ -2109,7 +2109,7 @@
           <p:cNvPr id="3" name="Footer Placeholder 2">
             <a:extLst>
               <a:ext uri="{FF2B5EF4-FFF2-40B4-BE49-F238E27FC236}">
-                <a16:creationId xmlns:a16="http://schemas.microsoft.com/office/drawing/2014/main" id="{8661E745-FFAC-4F64-99CE-BB39FB262973}"/>
+                <a16:creationId xmlns:a16="http://schemas.microsoft.com/office/drawing/2014/main" xmlns="" id="{8661E745-FFAC-4F64-99CE-BB39FB262973}"/>
               </a:ext>
             </a:extLst>
           </p:cNvPr>
@@ -2134,7 +2134,7 @@
           <p:cNvPr id="4" name="Slide Number Placeholder 3">
             <a:extLst>
               <a:ext uri="{FF2B5EF4-FFF2-40B4-BE49-F238E27FC236}">
-                <a16:creationId xmlns:a16="http://schemas.microsoft.com/office/drawing/2014/main" id="{DA10F40B-B864-4044-A183-D09EDF40128E}"/>
+                <a16:creationId xmlns:a16="http://schemas.microsoft.com/office/drawing/2014/main" xmlns="" id="{DA10F40B-B864-4044-A183-D09EDF40128E}"/>
               </a:ext>
             </a:extLst>
           </p:cNvPr>
@@ -2193,7 +2193,7 @@
           <p:cNvPr id="2" name="Title 1">
             <a:extLst>
               <a:ext uri="{FF2B5EF4-FFF2-40B4-BE49-F238E27FC236}">
-                <a16:creationId xmlns:a16="http://schemas.microsoft.com/office/drawing/2014/main" id="{ED79F5FC-4BD4-4793-9238-20F1087CF156}"/>
+                <a16:creationId xmlns:a16="http://schemas.microsoft.com/office/drawing/2014/main" xmlns="" id="{ED79F5FC-4BD4-4793-9238-20F1087CF156}"/>
               </a:ext>
             </a:extLst>
           </p:cNvPr>
@@ -2231,7 +2231,7 @@
           <p:cNvPr id="3" name="Content Placeholder 2">
             <a:extLst>
               <a:ext uri="{FF2B5EF4-FFF2-40B4-BE49-F238E27FC236}">
-                <a16:creationId xmlns:a16="http://schemas.microsoft.com/office/drawing/2014/main" id="{4CA54586-E239-48AC-AD5D-6B41860B40BC}"/>
+                <a16:creationId xmlns:a16="http://schemas.microsoft.com/office/drawing/2014/main" xmlns="" id="{4CA54586-E239-48AC-AD5D-6B41860B40BC}"/>
               </a:ext>
             </a:extLst>
           </p:cNvPr>
@@ -2322,7 +2322,7 @@
           <p:cNvPr id="4" name="Text Placeholder 3">
             <a:extLst>
               <a:ext uri="{FF2B5EF4-FFF2-40B4-BE49-F238E27FC236}">
-                <a16:creationId xmlns:a16="http://schemas.microsoft.com/office/drawing/2014/main" id="{F7A33968-E08D-4EC1-8DF5-793BBBF1F762}"/>
+                <a16:creationId xmlns:a16="http://schemas.microsoft.com/office/drawing/2014/main" xmlns="" id="{F7A33968-E08D-4EC1-8DF5-793BBBF1F762}"/>
               </a:ext>
             </a:extLst>
           </p:cNvPr>
@@ -2393,7 +2393,7 @@
           <p:cNvPr id="5" name="Date Placeholder 4">
             <a:extLst>
               <a:ext uri="{FF2B5EF4-FFF2-40B4-BE49-F238E27FC236}">
-                <a16:creationId xmlns:a16="http://schemas.microsoft.com/office/drawing/2014/main" id="{23438323-EBDA-4C98-AC26-7920F55CFA28}"/>
+                <a16:creationId xmlns:a16="http://schemas.microsoft.com/office/drawing/2014/main" xmlns="" id="{23438323-EBDA-4C98-AC26-7920F55CFA28}"/>
               </a:ext>
             </a:extLst>
           </p:cNvPr>
@@ -2411,7 +2411,7 @@
           <a:p>
             <a:fld id="{B37DD9E5-83AB-41E0-B8BF-4643EADF3FE0}" type="datetimeFigureOut">
               <a:rPr lang="en-IN" smtClean="0"/>
-              <a:t>02-12-2021</a:t>
+              <a:t>18-09-2025</a:t>
             </a:fld>
             <a:endParaRPr lang="en-IN"/>
           </a:p>
@@ -2422,7 +2422,7 @@
           <p:cNvPr id="6" name="Footer Placeholder 5">
             <a:extLst>
               <a:ext uri="{FF2B5EF4-FFF2-40B4-BE49-F238E27FC236}">
-                <a16:creationId xmlns:a16="http://schemas.microsoft.com/office/drawing/2014/main" id="{7702D1BC-A930-486C-B8AD-1A4388801E08}"/>
+                <a16:creationId xmlns:a16="http://schemas.microsoft.com/office/drawing/2014/main" xmlns="" id="{7702D1BC-A930-486C-B8AD-1A4388801E08}"/>
               </a:ext>
             </a:extLst>
           </p:cNvPr>
@@ -2447,7 +2447,7 @@
           <p:cNvPr id="7" name="Slide Number Placeholder 6">
             <a:extLst>
               <a:ext uri="{FF2B5EF4-FFF2-40B4-BE49-F238E27FC236}">
-                <a16:creationId xmlns:a16="http://schemas.microsoft.com/office/drawing/2014/main" id="{17D2CC4C-97E8-4033-87F3-72977DF0C2C5}"/>
+                <a16:creationId xmlns:a16="http://schemas.microsoft.com/office/drawing/2014/main" xmlns="" id="{17D2CC4C-97E8-4033-87F3-72977DF0C2C5}"/>
               </a:ext>
             </a:extLst>
           </p:cNvPr>
@@ -2506,7 +2506,7 @@
           <p:cNvPr id="2" name="Title 1">
             <a:extLst>
               <a:ext uri="{FF2B5EF4-FFF2-40B4-BE49-F238E27FC236}">
-                <a16:creationId xmlns:a16="http://schemas.microsoft.com/office/drawing/2014/main" id="{C815799D-0E4B-4480-85E4-1953852B85BC}"/>
+                <a16:creationId xmlns:a16="http://schemas.microsoft.com/office/drawing/2014/main" xmlns="" id="{C815799D-0E4B-4480-85E4-1953852B85BC}"/>
               </a:ext>
             </a:extLst>
           </p:cNvPr>
@@ -2544,7 +2544,7 @@
           <p:cNvPr id="3" name="Picture Placeholder 2">
             <a:extLst>
               <a:ext uri="{FF2B5EF4-FFF2-40B4-BE49-F238E27FC236}">
-                <a16:creationId xmlns:a16="http://schemas.microsoft.com/office/drawing/2014/main" id="{599424A3-4A13-4245-B936-E6376E5A1CD4}"/>
+                <a16:creationId xmlns:a16="http://schemas.microsoft.com/office/drawing/2014/main" xmlns="" id="{599424A3-4A13-4245-B936-E6376E5A1CD4}"/>
               </a:ext>
             </a:extLst>
           </p:cNvPr>
@@ -2611,7 +2611,7 @@
           <p:cNvPr id="4" name="Text Placeholder 3">
             <a:extLst>
               <a:ext uri="{FF2B5EF4-FFF2-40B4-BE49-F238E27FC236}">
-                <a16:creationId xmlns:a16="http://schemas.microsoft.com/office/drawing/2014/main" id="{87680D7D-5B9F-4B92-9A8A-226C711DE2A0}"/>
+                <a16:creationId xmlns:a16="http://schemas.microsoft.com/office/drawing/2014/main" xmlns="" id="{87680D7D-5B9F-4B92-9A8A-226C711DE2A0}"/>
               </a:ext>
             </a:extLst>
           </p:cNvPr>
@@ -2682,7 +2682,7 @@
           <p:cNvPr id="5" name="Date Placeholder 4">
             <a:extLst>
               <a:ext uri="{FF2B5EF4-FFF2-40B4-BE49-F238E27FC236}">
-                <a16:creationId xmlns:a16="http://schemas.microsoft.com/office/drawing/2014/main" id="{59182854-3903-4308-AA1E-EAC1DE9D1182}"/>
+                <a16:creationId xmlns:a16="http://schemas.microsoft.com/office/drawing/2014/main" xmlns="" id="{59182854-3903-4308-AA1E-EAC1DE9D1182}"/>
               </a:ext>
             </a:extLst>
           </p:cNvPr>
@@ -2700,7 +2700,7 @@
           <a:p>
             <a:fld id="{B37DD9E5-83AB-41E0-B8BF-4643EADF3FE0}" type="datetimeFigureOut">
               <a:rPr lang="en-IN" smtClean="0"/>
-              <a:t>02-12-2021</a:t>
+              <a:t>18-09-2025</a:t>
             </a:fld>
             <a:endParaRPr lang="en-IN"/>
           </a:p>
@@ -2711,7 +2711,7 @@
           <p:cNvPr id="6" name="Footer Placeholder 5">
             <a:extLst>
               <a:ext uri="{FF2B5EF4-FFF2-40B4-BE49-F238E27FC236}">
-                <a16:creationId xmlns:a16="http://schemas.microsoft.com/office/drawing/2014/main" id="{D2D156F5-238B-40E6-BA64-D9D12036A0BA}"/>
+                <a16:creationId xmlns:a16="http://schemas.microsoft.com/office/drawing/2014/main" xmlns="" id="{D2D156F5-238B-40E6-BA64-D9D12036A0BA}"/>
               </a:ext>
             </a:extLst>
           </p:cNvPr>
@@ -2736,7 +2736,7 @@
           <p:cNvPr id="7" name="Slide Number Placeholder 6">
             <a:extLst>
               <a:ext uri="{FF2B5EF4-FFF2-40B4-BE49-F238E27FC236}">
-                <a16:creationId xmlns:a16="http://schemas.microsoft.com/office/drawing/2014/main" id="{740CBC1B-1DDE-4D58-A50B-48D85AF25EF2}"/>
+                <a16:creationId xmlns:a16="http://schemas.microsoft.com/office/drawing/2014/main" xmlns="" id="{740CBC1B-1DDE-4D58-A50B-48D85AF25EF2}"/>
               </a:ext>
             </a:extLst>
           </p:cNvPr>
@@ -2800,7 +2800,7 @@
           <p:cNvPr id="2" name="Title Placeholder 1">
             <a:extLst>
               <a:ext uri="{FF2B5EF4-FFF2-40B4-BE49-F238E27FC236}">
-                <a16:creationId xmlns:a16="http://schemas.microsoft.com/office/drawing/2014/main" id="{0ED23765-F1AA-41A6-B5FA-738347BC0C2D}"/>
+                <a16:creationId xmlns:a16="http://schemas.microsoft.com/office/drawing/2014/main" xmlns="" id="{0ED23765-F1AA-41A6-B5FA-738347BC0C2D}"/>
               </a:ext>
             </a:extLst>
           </p:cNvPr>
@@ -2839,7 +2839,7 @@
           <p:cNvPr id="3" name="Text Placeholder 2">
             <a:extLst>
               <a:ext uri="{FF2B5EF4-FFF2-40B4-BE49-F238E27FC236}">
-                <a16:creationId xmlns:a16="http://schemas.microsoft.com/office/drawing/2014/main" id="{304F8F29-3B91-4749-A67E-CCBD8C91D320}"/>
+                <a16:creationId xmlns:a16="http://schemas.microsoft.com/office/drawing/2014/main" xmlns="" id="{304F8F29-3B91-4749-A67E-CCBD8C91D320}"/>
               </a:ext>
             </a:extLst>
           </p:cNvPr>
@@ -2907,7 +2907,7 @@
           <p:cNvPr id="4" name="Date Placeholder 3">
             <a:extLst>
               <a:ext uri="{FF2B5EF4-FFF2-40B4-BE49-F238E27FC236}">
-                <a16:creationId xmlns:a16="http://schemas.microsoft.com/office/drawing/2014/main" id="{4F84D6E8-EFB4-4F27-8847-48CDEFAF637C}"/>
+                <a16:creationId xmlns:a16="http://schemas.microsoft.com/office/drawing/2014/main" xmlns="" id="{4F84D6E8-EFB4-4F27-8847-48CDEFAF637C}"/>
               </a:ext>
             </a:extLst>
           </p:cNvPr>
@@ -2943,7 +2943,7 @@
           <a:p>
             <a:fld id="{B37DD9E5-83AB-41E0-B8BF-4643EADF3FE0}" type="datetimeFigureOut">
               <a:rPr lang="en-IN" smtClean="0"/>
-              <a:t>02-12-2021</a:t>
+              <a:t>18-09-2025</a:t>
             </a:fld>
             <a:endParaRPr lang="en-IN"/>
           </a:p>
@@ -2954,7 +2954,7 @@
           <p:cNvPr id="5" name="Footer Placeholder 4">
             <a:extLst>
               <a:ext uri="{FF2B5EF4-FFF2-40B4-BE49-F238E27FC236}">
-                <a16:creationId xmlns:a16="http://schemas.microsoft.com/office/drawing/2014/main" id="{5C7D862A-B373-429B-8FA2-E09983395A2F}"/>
+                <a16:creationId xmlns:a16="http://schemas.microsoft.com/office/drawing/2014/main" xmlns="" id="{5C7D862A-B373-429B-8FA2-E09983395A2F}"/>
               </a:ext>
             </a:extLst>
           </p:cNvPr>
@@ -2997,7 +2997,7 @@
           <p:cNvPr id="6" name="Slide Number Placeholder 5">
             <a:extLst>
               <a:ext uri="{FF2B5EF4-FFF2-40B4-BE49-F238E27FC236}">
-                <a16:creationId xmlns:a16="http://schemas.microsoft.com/office/drawing/2014/main" id="{1187C952-9249-48DF-864B-6DAF11CB3AAA}"/>
+                <a16:creationId xmlns:a16="http://schemas.microsoft.com/office/drawing/2014/main" xmlns="" id="{1187C952-9249-48DF-864B-6DAF11CB3AAA}"/>
               </a:ext>
             </a:extLst>
           </p:cNvPr>
@@ -3365,7 +3365,7 @@
           <p:cNvPr id="2" name="Title 1">
             <a:extLst>
               <a:ext uri="{FF2B5EF4-FFF2-40B4-BE49-F238E27FC236}">
-                <a16:creationId xmlns:a16="http://schemas.microsoft.com/office/drawing/2014/main" id="{9CEB4AFA-C408-4BE5-B9DB-02BA49C3FA4B}"/>
+                <a16:creationId xmlns:a16="http://schemas.microsoft.com/office/drawing/2014/main" xmlns="" id="{9CEB4AFA-C408-4BE5-B9DB-02BA49C3FA4B}"/>
               </a:ext>
             </a:extLst>
           </p:cNvPr>
@@ -3393,7 +3393,7 @@
           <p:cNvPr id="3" name="Subtitle 2">
             <a:extLst>
               <a:ext uri="{FF2B5EF4-FFF2-40B4-BE49-F238E27FC236}">
-                <a16:creationId xmlns:a16="http://schemas.microsoft.com/office/drawing/2014/main" id="{DF5BC16F-1A14-4D75-88B2-99592AC2B7A0}"/>
+                <a16:creationId xmlns:a16="http://schemas.microsoft.com/office/drawing/2014/main" xmlns="" id="{DF5BC16F-1A14-4D75-88B2-99592AC2B7A0}"/>
               </a:ext>
             </a:extLst>
           </p:cNvPr>
@@ -3426,6 +3426,13 @@
   <p:clrMapOvr>
     <a:masterClrMapping/>
   </p:clrMapOvr>
+  <p:timing>
+    <p:tnLst>
+      <p:par>
+        <p:cTn id="1" dur="indefinite" restart="never" nodeType="tmRoot"/>
+      </p:par>
+    </p:tnLst>
+  </p:timing>
 </p:sld>
 </file>
 
@@ -3451,7 +3458,7 @@
           <p:cNvPr id="3" name="Content Placeholder 2">
             <a:extLst>
               <a:ext uri="{FF2B5EF4-FFF2-40B4-BE49-F238E27FC236}">
-                <a16:creationId xmlns:a16="http://schemas.microsoft.com/office/drawing/2014/main" id="{45861DAF-E364-47AB-87DB-87F2391AD20A}"/>
+                <a16:creationId xmlns:a16="http://schemas.microsoft.com/office/drawing/2014/main" xmlns="" id="{45861DAF-E364-47AB-87DB-87F2391AD20A}"/>
               </a:ext>
             </a:extLst>
           </p:cNvPr>
@@ -3573,7 +3580,7 @@
           <p:cNvPr id="6" name="TextBox 5">
             <a:extLst>
               <a:ext uri="{FF2B5EF4-FFF2-40B4-BE49-F238E27FC236}">
-                <a16:creationId xmlns:a16="http://schemas.microsoft.com/office/drawing/2014/main" id="{53B67D21-2FF1-4031-ADA3-795B62CAB46C}"/>
+                <a16:creationId xmlns:a16="http://schemas.microsoft.com/office/drawing/2014/main" xmlns="" id="{53B67D21-2FF1-4031-ADA3-795B62CAB46C}"/>
               </a:ext>
             </a:extLst>
           </p:cNvPr>
@@ -3591,7 +3598,7 @@
         </p:spPr>
         <p:txBody>
           <a:bodyPr vert="horz" lIns="91440" tIns="45720" rIns="91440" bIns="45720" rtlCol="0">
-            <a:normAutofit/>
+            <a:normAutofit fontScale="55000" lnSpcReduction="20000"/>
           </a:bodyPr>
           <a:lstStyle>
             <a:lvl1pPr marL="228600" indent="-228600" algn="just">
@@ -3776,7 +3783,7 @@
           <p:cNvPr id="3" name="Content Placeholder 2">
             <a:extLst>
               <a:ext uri="{FF2B5EF4-FFF2-40B4-BE49-F238E27FC236}">
-                <a16:creationId xmlns:a16="http://schemas.microsoft.com/office/drawing/2014/main" id="{CF3D3042-5895-4DA9-9718-D66E786F32A0}"/>
+                <a16:creationId xmlns:a16="http://schemas.microsoft.com/office/drawing/2014/main" xmlns="" id="{CF3D3042-5895-4DA9-9718-D66E786F32A0}"/>
               </a:ext>
             </a:extLst>
           </p:cNvPr>
@@ -3877,7 +3884,7 @@
           <p:cNvPr id="3" name="Content Placeholder 2">
             <a:extLst>
               <a:ext uri="{FF2B5EF4-FFF2-40B4-BE49-F238E27FC236}">
-                <a16:creationId xmlns:a16="http://schemas.microsoft.com/office/drawing/2014/main" id="{7C7B98D9-8812-404B-8F08-3C5A3F3F3875}"/>
+                <a16:creationId xmlns:a16="http://schemas.microsoft.com/office/drawing/2014/main" xmlns="" id="{7C7B98D9-8812-404B-8F08-3C5A3F3F3875}"/>
               </a:ext>
             </a:extLst>
           </p:cNvPr>
@@ -3966,7 +3973,7 @@
           <p:cNvPr id="3" name="Content Placeholder 2">
             <a:extLst>
               <a:ext uri="{FF2B5EF4-FFF2-40B4-BE49-F238E27FC236}">
-                <a16:creationId xmlns:a16="http://schemas.microsoft.com/office/drawing/2014/main" id="{0542CA9A-6B67-4186-A2B0-7902C8316B2A}"/>
+                <a16:creationId xmlns:a16="http://schemas.microsoft.com/office/drawing/2014/main" xmlns="" id="{0542CA9A-6B67-4186-A2B0-7902C8316B2A}"/>
               </a:ext>
             </a:extLst>
           </p:cNvPr>
@@ -4063,7 +4070,7 @@
           <p:cNvPr id="2" name="Title 1">
             <a:extLst>
               <a:ext uri="{FF2B5EF4-FFF2-40B4-BE49-F238E27FC236}">
-                <a16:creationId xmlns:a16="http://schemas.microsoft.com/office/drawing/2014/main" id="{FBC61D37-AB1C-4545-B828-48B415FD1A09}"/>
+                <a16:creationId xmlns:a16="http://schemas.microsoft.com/office/drawing/2014/main" xmlns="" id="{FBC61D37-AB1C-4545-B828-48B415FD1A09}"/>
               </a:ext>
             </a:extLst>
           </p:cNvPr>
@@ -4091,7 +4098,7 @@
           <p:cNvPr id="3" name="Content Placeholder 2">
             <a:extLst>
               <a:ext uri="{FF2B5EF4-FFF2-40B4-BE49-F238E27FC236}">
-                <a16:creationId xmlns:a16="http://schemas.microsoft.com/office/drawing/2014/main" id="{99676E5A-8EB2-44C6-8685-45AA96A6C030}"/>
+                <a16:creationId xmlns:a16="http://schemas.microsoft.com/office/drawing/2014/main" xmlns="" id="{99676E5A-8EB2-44C6-8685-45AA96A6C030}"/>
               </a:ext>
             </a:extLst>
           </p:cNvPr>
@@ -4136,6 +4143,13 @@
   <p:clrMapOvr>
     <a:masterClrMapping/>
   </p:clrMapOvr>
+  <p:timing>
+    <p:tnLst>
+      <p:par>
+        <p:cTn id="1" dur="indefinite" restart="never" nodeType="tmRoot"/>
+      </p:par>
+    </p:tnLst>
+  </p:timing>
 </p:sld>
 </file>
 
@@ -4161,7 +4175,7 @@
           <p:cNvPr id="2" name="Title 1">
             <a:extLst>
               <a:ext uri="{FF2B5EF4-FFF2-40B4-BE49-F238E27FC236}">
-                <a16:creationId xmlns:a16="http://schemas.microsoft.com/office/drawing/2014/main" id="{F0C06F84-1418-40AD-A2B6-340968858B5D}"/>
+                <a16:creationId xmlns:a16="http://schemas.microsoft.com/office/drawing/2014/main" xmlns="" id="{F0C06F84-1418-40AD-A2B6-340968858B5D}"/>
               </a:ext>
             </a:extLst>
           </p:cNvPr>
@@ -4191,7 +4205,7 @@
           <p:cNvPr id="3" name="Content Placeholder 2">
             <a:extLst>
               <a:ext uri="{FF2B5EF4-FFF2-40B4-BE49-F238E27FC236}">
-                <a16:creationId xmlns:a16="http://schemas.microsoft.com/office/drawing/2014/main" id="{D4DC7721-0302-4578-B539-6DB9FEB569B7}"/>
+                <a16:creationId xmlns:a16="http://schemas.microsoft.com/office/drawing/2014/main" xmlns="" id="{D4DC7721-0302-4578-B539-6DB9FEB569B7}"/>
               </a:ext>
             </a:extLst>
           </p:cNvPr>
@@ -4242,6 +4256,13 @@
   <p:clrMapOvr>
     <a:masterClrMapping/>
   </p:clrMapOvr>
+  <p:timing>
+    <p:tnLst>
+      <p:par>
+        <p:cTn id="1" dur="indefinite" restart="never" nodeType="tmRoot"/>
+      </p:par>
+    </p:tnLst>
+  </p:timing>
 </p:sld>
 </file>
 
@@ -4267,7 +4288,7 @@
           <p:cNvPr id="2" name="Title 1">
             <a:extLst>
               <a:ext uri="{FF2B5EF4-FFF2-40B4-BE49-F238E27FC236}">
-                <a16:creationId xmlns:a16="http://schemas.microsoft.com/office/drawing/2014/main" id="{8A638097-56E2-4103-9CD9-3A43F8CD4C0D}"/>
+                <a16:creationId xmlns:a16="http://schemas.microsoft.com/office/drawing/2014/main" xmlns="" id="{8A638097-56E2-4103-9CD9-3A43F8CD4C0D}"/>
               </a:ext>
             </a:extLst>
           </p:cNvPr>
@@ -4297,7 +4318,7 @@
           <p:cNvPr id="3" name="Content Placeholder 2">
             <a:extLst>
               <a:ext uri="{FF2B5EF4-FFF2-40B4-BE49-F238E27FC236}">
-                <a16:creationId xmlns:a16="http://schemas.microsoft.com/office/drawing/2014/main" id="{C90207FA-CA15-4CEE-A2CE-E5B82BB05CFE}"/>
+                <a16:creationId xmlns:a16="http://schemas.microsoft.com/office/drawing/2014/main" xmlns="" id="{C90207FA-CA15-4CEE-A2CE-E5B82BB05CFE}"/>
               </a:ext>
             </a:extLst>
           </p:cNvPr>
@@ -4325,8 +4346,20 @@
           </a:p>
           <a:p>
             <a:r>
-              <a:rPr lang="en-IN" dirty="0"/>
-              <a:t>Guideline-1: Do not combine attributes from multiple entity types and relationship types into a single relation</a:t>
+              <a:rPr lang="en-IN" b="1" u="sng" dirty="0" smtClean="0"/>
+              <a:t>Guideline-1</a:t>
+            </a:r>
+            <a:r>
+              <a:rPr lang="en-IN" dirty="0" smtClean="0"/>
+              <a:t>: </a:t>
+            </a:r>
+            <a:r>
+              <a:rPr lang="en-IN" dirty="0">
+                <a:solidFill>
+                  <a:schemeClr val="accent2"/>
+                </a:solidFill>
+              </a:rPr>
+              <a:t>Do not combine attributes from multiple entity types and relationship types into a single relation</a:t>
             </a:r>
           </a:p>
           <a:p>
@@ -4345,7 +4378,7 @@
           <p:cNvPr id="5" name="Picture 4">
             <a:extLst>
               <a:ext uri="{FF2B5EF4-FFF2-40B4-BE49-F238E27FC236}">
-                <a16:creationId xmlns:a16="http://schemas.microsoft.com/office/drawing/2014/main" id="{D221E2EF-5A30-4C65-9D2E-00FEE278884C}"/>
+                <a16:creationId xmlns:a16="http://schemas.microsoft.com/office/drawing/2014/main" xmlns="" id="{D221E2EF-5A30-4C65-9D2E-00FEE278884C}"/>
               </a:ext>
             </a:extLst>
           </p:cNvPr>
@@ -4380,6 +4413,13 @@
   <p:clrMapOvr>
     <a:masterClrMapping/>
   </p:clrMapOvr>
+  <p:timing>
+    <p:tnLst>
+      <p:par>
+        <p:cTn id="1" dur="indefinite" restart="never" nodeType="tmRoot"/>
+      </p:par>
+    </p:tnLst>
+  </p:timing>
 </p:sld>
 </file>
 
@@ -4405,7 +4445,7 @@
           <p:cNvPr id="2" name="Title 1">
             <a:extLst>
               <a:ext uri="{FF2B5EF4-FFF2-40B4-BE49-F238E27FC236}">
-                <a16:creationId xmlns:a16="http://schemas.microsoft.com/office/drawing/2014/main" id="{350E51A9-9C49-4F6A-A4DF-11CBB62608D3}"/>
+                <a16:creationId xmlns:a16="http://schemas.microsoft.com/office/drawing/2014/main" xmlns="" id="{350E51A9-9C49-4F6A-A4DF-11CBB62608D3}"/>
               </a:ext>
             </a:extLst>
           </p:cNvPr>
@@ -4440,7 +4480,7 @@
           <p:cNvPr id="3" name="Content Placeholder 2">
             <a:extLst>
               <a:ext uri="{FF2B5EF4-FFF2-40B4-BE49-F238E27FC236}">
-                <a16:creationId xmlns:a16="http://schemas.microsoft.com/office/drawing/2014/main" id="{29FC1968-EBCE-4D6F-9329-884D3880BC2F}"/>
+                <a16:creationId xmlns:a16="http://schemas.microsoft.com/office/drawing/2014/main" xmlns="" id="{29FC1968-EBCE-4D6F-9329-884D3880BC2F}"/>
               </a:ext>
             </a:extLst>
           </p:cNvPr>
@@ -4465,8 +4505,12 @@
           <a:p>
             <a:pPr algn="just"/>
             <a:r>
-              <a:rPr lang="en-IN" dirty="0"/>
-              <a:t>Insertion Anomalies: Considering </a:t>
+              <a:rPr lang="en-IN" b="1" dirty="0"/>
+              <a:t>Insertion Anomalies</a:t>
+            </a:r>
+            <a:r>
+              <a:rPr lang="en-IN" dirty="0"/>
+              <a:t>: Considering </a:t>
             </a:r>
             <a:r>
               <a:rPr lang="en-IN" dirty="0" err="1"/>
@@ -4502,15 +4546,19 @@
           <a:p>
             <a:pPr algn="just"/>
             <a:r>
-              <a:rPr lang="en-IN" dirty="0"/>
+              <a:rPr lang="en-IN" b="1" dirty="0"/>
               <a:t>Deletion Anomalies</a:t>
             </a:r>
           </a:p>
           <a:p>
             <a:pPr algn="just"/>
             <a:r>
-              <a:rPr lang="en-IN" dirty="0"/>
-              <a:t>Modification Anomalies: </a:t>
+              <a:rPr lang="en-IN" b="1" dirty="0"/>
+              <a:t>Modification Anomalies</a:t>
+            </a:r>
+            <a:r>
+              <a:rPr lang="en-IN" dirty="0"/>
+              <a:t>: </a:t>
             </a:r>
           </a:p>
           <a:p>
@@ -4527,8 +4575,20 @@
           <a:p>
             <a:pPr algn="just"/>
             <a:r>
-              <a:rPr lang="en-IN" dirty="0"/>
-              <a:t>Guideline 2: Design the base relation schema so that no anomalies are present in the relations.</a:t>
+              <a:rPr lang="en-IN" b="1" u="sng" dirty="0"/>
+              <a:t>Guideline 2: </a:t>
+            </a:r>
+            <a:r>
+              <a:rPr lang="en-IN" dirty="0">
+                <a:solidFill>
+                  <a:schemeClr val="accent2"/>
+                </a:solidFill>
+              </a:rPr>
+              <a:t>Design the base relation schema so that no anomalies are present in the relations</a:t>
+            </a:r>
+            <a:r>
+              <a:rPr lang="en-IN" dirty="0"/>
+              <a:t>.</a:t>
             </a:r>
           </a:p>
         </p:txBody>
@@ -4543,6 +4603,13 @@
   <p:clrMapOvr>
     <a:masterClrMapping/>
   </p:clrMapOvr>
+  <p:timing>
+    <p:tnLst>
+      <p:par>
+        <p:cTn id="1" dur="indefinite" restart="never" nodeType="tmRoot"/>
+      </p:par>
+    </p:tnLst>
+  </p:timing>
 </p:sld>
 </file>
 
@@ -4568,7 +4635,7 @@
           <p:cNvPr id="2" name="Title 1">
             <a:extLst>
               <a:ext uri="{FF2B5EF4-FFF2-40B4-BE49-F238E27FC236}">
-                <a16:creationId xmlns:a16="http://schemas.microsoft.com/office/drawing/2014/main" id="{0F4A42D7-3857-4D48-8A1E-771C00F0E7F9}"/>
+                <a16:creationId xmlns:a16="http://schemas.microsoft.com/office/drawing/2014/main" xmlns="" id="{0F4A42D7-3857-4D48-8A1E-771C00F0E7F9}"/>
               </a:ext>
             </a:extLst>
           </p:cNvPr>
@@ -4596,7 +4663,7 @@
           <p:cNvPr id="3" name="Content Placeholder 2">
             <a:extLst>
               <a:ext uri="{FF2B5EF4-FFF2-40B4-BE49-F238E27FC236}">
-                <a16:creationId xmlns:a16="http://schemas.microsoft.com/office/drawing/2014/main" id="{B7CB7F72-EDC0-486C-9F4C-65EF037AF8BC}"/>
+                <a16:creationId xmlns:a16="http://schemas.microsoft.com/office/drawing/2014/main" xmlns="" id="{B7CB7F72-EDC0-486C-9F4C-65EF037AF8BC}"/>
               </a:ext>
             </a:extLst>
           </p:cNvPr>
@@ -4613,20 +4680,44 @@
           <a:lstStyle/>
           <a:p>
             <a:r>
-              <a:rPr lang="en-IN" dirty="0"/>
-              <a:t>Guideline 3: </a:t>
-            </a:r>
-          </a:p>
-          <a:p>
-            <a:r>
-              <a:rPr lang="en-IN" dirty="0"/>
-              <a:t>Avoid placing attributes in a base relation whose values may frequently be null.</a:t>
-            </a:r>
-          </a:p>
-          <a:p>
-            <a:r>
-              <a:rPr lang="en-IN" dirty="0"/>
-              <a:t>If NULLs are unavoidable, make sure that they apply in exceptional cases only and do not apply to majority of tuples in the relation </a:t>
+              <a:rPr lang="en-IN" b="1" u="sng" dirty="0"/>
+              <a:t>Guideline 3</a:t>
+            </a:r>
+            <a:r>
+              <a:rPr lang="en-IN" dirty="0"/>
+              <a:t>: </a:t>
+            </a:r>
+          </a:p>
+          <a:p>
+            <a:r>
+              <a:rPr lang="en-IN" dirty="0">
+                <a:solidFill>
+                  <a:schemeClr val="accent2"/>
+                </a:solidFill>
+              </a:rPr>
+              <a:t>Avoid placing attributes in a base relation whose values may frequently be null</a:t>
+            </a:r>
+            <a:r>
+              <a:rPr lang="en-IN" dirty="0"/>
+              <a:t>.</a:t>
+            </a:r>
+          </a:p>
+          <a:p>
+            <a:r>
+              <a:rPr lang="en-IN" dirty="0"/>
+              <a:t>If NULLs are unavoidable, make sure that they apply in exceptional cases only </a:t>
+            </a:r>
+            <a:r>
+              <a:rPr lang="en-IN" dirty="0" err="1" smtClean="0"/>
+              <a:t>a.d</a:t>
+            </a:r>
+            <a:r>
+              <a:rPr lang="en-IN" dirty="0" smtClean="0"/>
+              <a:t> </a:t>
+            </a:r>
+            <a:r>
+              <a:rPr lang="en-IN" dirty="0"/>
+              <a:t>do not apply to majority of tuples in the relation </a:t>
             </a:r>
           </a:p>
         </p:txBody>
@@ -4666,7 +4757,7 @@
           <p:cNvPr id="2" name="Title 1">
             <a:extLst>
               <a:ext uri="{FF2B5EF4-FFF2-40B4-BE49-F238E27FC236}">
-                <a16:creationId xmlns:a16="http://schemas.microsoft.com/office/drawing/2014/main" id="{8922604E-B7F0-4A77-A697-B9D1E84A0E0E}"/>
+                <a16:creationId xmlns:a16="http://schemas.microsoft.com/office/drawing/2014/main" xmlns="" id="{8922604E-B7F0-4A77-A697-B9D1E84A0E0E}"/>
               </a:ext>
             </a:extLst>
           </p:cNvPr>
@@ -4694,7 +4785,7 @@
           <p:cNvPr id="3" name="Content Placeholder 2">
             <a:extLst>
               <a:ext uri="{FF2B5EF4-FFF2-40B4-BE49-F238E27FC236}">
-                <a16:creationId xmlns:a16="http://schemas.microsoft.com/office/drawing/2014/main" id="{800D67F7-6226-4477-B9DC-E2D910FE1162}"/>
+                <a16:creationId xmlns:a16="http://schemas.microsoft.com/office/drawing/2014/main" xmlns="" id="{800D67F7-6226-4477-B9DC-E2D910FE1162}"/>
               </a:ext>
             </a:extLst>
           </p:cNvPr>
@@ -4711,21 +4802,24 @@
           <a:lstStyle/>
           <a:p>
             <a:r>
-              <a:rPr lang="en-IN" dirty="0"/>
+              <a:rPr lang="en-IN" b="1" u="sng" dirty="0"/>
               <a:t>Guideline 4:</a:t>
             </a:r>
           </a:p>
           <a:p>
             <a:pPr lvl="1"/>
             <a:r>
-              <a:rPr lang="en-IN" dirty="0"/>
-              <a:t>Design relational schemas so that they can be joined with equality conditions on attributes that are appropriately related pairs (PK &amp; FK) in a way that guarantees that no spurious tuples </a:t>
-            </a:r>
-            <a:r>
-              <a:rPr lang="en-IN"/>
-              <a:t>are generated</a:t>
-            </a:r>
-            <a:endParaRPr lang="en-IN" dirty="0"/>
+              <a:rPr lang="en-IN" dirty="0">
+                <a:solidFill>
+                  <a:schemeClr val="accent2"/>
+                </a:solidFill>
+              </a:rPr>
+              <a:t>Design relational schemas so that they can be joined with equality conditions on attributes that are appropriately related pairs (PK &amp; FK) </a:t>
+            </a:r>
+            <a:r>
+              <a:rPr lang="en-IN" dirty="0"/>
+              <a:t>in a way that guarantees that no spurious tuples are generated</a:t>
+            </a:r>
           </a:p>
         </p:txBody>
       </p:sp>
@@ -4764,7 +4858,7 @@
           <p:cNvPr id="2" name="Title 1">
             <a:extLst>
               <a:ext uri="{FF2B5EF4-FFF2-40B4-BE49-F238E27FC236}">
-                <a16:creationId xmlns:a16="http://schemas.microsoft.com/office/drawing/2014/main" id="{110E8370-3A14-494D-B62B-51C9BE20A509}"/>
+                <a16:creationId xmlns:a16="http://schemas.microsoft.com/office/drawing/2014/main" xmlns="" id="{110E8370-3A14-494D-B62B-51C9BE20A509}"/>
               </a:ext>
             </a:extLst>
           </p:cNvPr>
@@ -4792,7 +4886,7 @@
           <p:cNvPr id="3" name="Content Placeholder 2">
             <a:extLst>
               <a:ext uri="{FF2B5EF4-FFF2-40B4-BE49-F238E27FC236}">
-                <a16:creationId xmlns:a16="http://schemas.microsoft.com/office/drawing/2014/main" id="{BADDB335-868F-4416-9E36-21C2F373A1FD}"/>
+                <a16:creationId xmlns:a16="http://schemas.microsoft.com/office/drawing/2014/main" xmlns="" id="{BADDB335-868F-4416-9E36-21C2F373A1FD}"/>
               </a:ext>
             </a:extLst>
           </p:cNvPr>
@@ -4818,7 +4912,19 @@
             <a:pPr algn="just"/>
             <a:r>
               <a:rPr lang="en-IN" dirty="0"/>
-              <a:t>Every database has tables, and constraints cannot be referred to as a rational database system. </a:t>
+              <a:t>Every database has </a:t>
+            </a:r>
+            <a:r>
+              <a:rPr lang="en-IN" dirty="0" err="1" smtClean="0"/>
+              <a:t>ecannot</a:t>
+            </a:r>
+            <a:r>
+              <a:rPr lang="en-IN" dirty="0" smtClean="0"/>
+              <a:t> </a:t>
+            </a:r>
+            <a:r>
+              <a:rPr lang="en-IN" dirty="0"/>
+              <a:t>be referred to as a rational database system. </a:t>
             </a:r>
           </a:p>
           <a:p>
@@ -4901,7 +5007,7 @@
           <p:cNvPr id="3" name="Content Placeholder 2">
             <a:extLst>
               <a:ext uri="{FF2B5EF4-FFF2-40B4-BE49-F238E27FC236}">
-                <a16:creationId xmlns:a16="http://schemas.microsoft.com/office/drawing/2014/main" id="{DE0AE244-AC56-4F9E-8510-AF3EE3479D30}"/>
+                <a16:creationId xmlns:a16="http://schemas.microsoft.com/office/drawing/2014/main" xmlns="" id="{DE0AE244-AC56-4F9E-8510-AF3EE3479D30}"/>
               </a:ext>
             </a:extLst>
           </p:cNvPr>

</xml_diff>